<commit_message>
Update | SpringBoot Settings
</commit_message>
<xml_diff>
--- a/03-스프링 부트 개념과 활용/assets/image.pptx
+++ b/03-스프링 부트 개념과 활용/assets/image.pptx
@@ -105,6 +105,11 @@
       </a:defRPr>
     </a:lvl9pPr>
   </p:defaultTextStyle>
+  <p:extLst>
+    <p:ext uri="{EFAFB233-063F-42B5-8137-9DF3F51BA10A}">
+      <p15:sldGuideLst xmlns:p15="http://schemas.microsoft.com/office/powerpoint/2012/main"/>
+    </p:ext>
+  </p:extLst>
 </p:presentation>
 </file>
 
@@ -257,7 +262,7 @@
           <a:p>
             <a:fld id="{8BF48431-9A6F-8A44-AE8D-657D68852F8B}" type="datetimeFigureOut">
               <a:rPr kumimoji="1" lang="ko-Kore-KR" altLang="en-US" smtClean="0"/>
-              <a:t>2021. 6. 4.</a:t>
+              <a:t>2021. 6. 6.</a:t>
             </a:fld>
             <a:endParaRPr kumimoji="1" lang="ko-Kore-KR" altLang="en-US"/>
           </a:p>
@@ -457,7 +462,7 @@
           <a:p>
             <a:fld id="{8BF48431-9A6F-8A44-AE8D-657D68852F8B}" type="datetimeFigureOut">
               <a:rPr kumimoji="1" lang="ko-Kore-KR" altLang="en-US" smtClean="0"/>
-              <a:t>2021. 6. 4.</a:t>
+              <a:t>2021. 6. 6.</a:t>
             </a:fld>
             <a:endParaRPr kumimoji="1" lang="ko-Kore-KR" altLang="en-US"/>
           </a:p>
@@ -667,7 +672,7 @@
           <a:p>
             <a:fld id="{8BF48431-9A6F-8A44-AE8D-657D68852F8B}" type="datetimeFigureOut">
               <a:rPr kumimoji="1" lang="ko-Kore-KR" altLang="en-US" smtClean="0"/>
-              <a:t>2021. 6. 4.</a:t>
+              <a:t>2021. 6. 6.</a:t>
             </a:fld>
             <a:endParaRPr kumimoji="1" lang="ko-Kore-KR" altLang="en-US"/>
           </a:p>
@@ -867,7 +872,7 @@
           <a:p>
             <a:fld id="{8BF48431-9A6F-8A44-AE8D-657D68852F8B}" type="datetimeFigureOut">
               <a:rPr kumimoji="1" lang="ko-Kore-KR" altLang="en-US" smtClean="0"/>
-              <a:t>2021. 6. 4.</a:t>
+              <a:t>2021. 6. 6.</a:t>
             </a:fld>
             <a:endParaRPr kumimoji="1" lang="ko-Kore-KR" altLang="en-US"/>
           </a:p>
@@ -1143,7 +1148,7 @@
           <a:p>
             <a:fld id="{8BF48431-9A6F-8A44-AE8D-657D68852F8B}" type="datetimeFigureOut">
               <a:rPr kumimoji="1" lang="ko-Kore-KR" altLang="en-US" smtClean="0"/>
-              <a:t>2021. 6. 4.</a:t>
+              <a:t>2021. 6. 6.</a:t>
             </a:fld>
             <a:endParaRPr kumimoji="1" lang="ko-Kore-KR" altLang="en-US"/>
           </a:p>
@@ -1411,7 +1416,7 @@
           <a:p>
             <a:fld id="{8BF48431-9A6F-8A44-AE8D-657D68852F8B}" type="datetimeFigureOut">
               <a:rPr kumimoji="1" lang="ko-Kore-KR" altLang="en-US" smtClean="0"/>
-              <a:t>2021. 6. 4.</a:t>
+              <a:t>2021. 6. 6.</a:t>
             </a:fld>
             <a:endParaRPr kumimoji="1" lang="ko-Kore-KR" altLang="en-US"/>
           </a:p>
@@ -1826,7 +1831,7 @@
           <a:p>
             <a:fld id="{8BF48431-9A6F-8A44-AE8D-657D68852F8B}" type="datetimeFigureOut">
               <a:rPr kumimoji="1" lang="ko-Kore-KR" altLang="en-US" smtClean="0"/>
-              <a:t>2021. 6. 4.</a:t>
+              <a:t>2021. 6. 6.</a:t>
             </a:fld>
             <a:endParaRPr kumimoji="1" lang="ko-Kore-KR" altLang="en-US"/>
           </a:p>
@@ -1968,7 +1973,7 @@
           <a:p>
             <a:fld id="{8BF48431-9A6F-8A44-AE8D-657D68852F8B}" type="datetimeFigureOut">
               <a:rPr kumimoji="1" lang="ko-Kore-KR" altLang="en-US" smtClean="0"/>
-              <a:t>2021. 6. 4.</a:t>
+              <a:t>2021. 6. 6.</a:t>
             </a:fld>
             <a:endParaRPr kumimoji="1" lang="ko-Kore-KR" altLang="en-US"/>
           </a:p>
@@ -2081,7 +2086,7 @@
           <a:p>
             <a:fld id="{8BF48431-9A6F-8A44-AE8D-657D68852F8B}" type="datetimeFigureOut">
               <a:rPr kumimoji="1" lang="ko-Kore-KR" altLang="en-US" smtClean="0"/>
-              <a:t>2021. 6. 4.</a:t>
+              <a:t>2021. 6. 6.</a:t>
             </a:fld>
             <a:endParaRPr kumimoji="1" lang="ko-Kore-KR" altLang="en-US"/>
           </a:p>
@@ -2394,7 +2399,7 @@
           <a:p>
             <a:fld id="{8BF48431-9A6F-8A44-AE8D-657D68852F8B}" type="datetimeFigureOut">
               <a:rPr kumimoji="1" lang="ko-Kore-KR" altLang="en-US" smtClean="0"/>
-              <a:t>2021. 6. 4.</a:t>
+              <a:t>2021. 6. 6.</a:t>
             </a:fld>
             <a:endParaRPr kumimoji="1" lang="ko-Kore-KR" altLang="en-US"/>
           </a:p>
@@ -2683,7 +2688,7 @@
           <a:p>
             <a:fld id="{8BF48431-9A6F-8A44-AE8D-657D68852F8B}" type="datetimeFigureOut">
               <a:rPr kumimoji="1" lang="ko-Kore-KR" altLang="en-US" smtClean="0"/>
-              <a:t>2021. 6. 4.</a:t>
+              <a:t>2021. 6. 6.</a:t>
             </a:fld>
             <a:endParaRPr kumimoji="1" lang="ko-Kore-KR" altLang="en-US"/>
           </a:p>
@@ -2926,7 +2931,7 @@
           <a:p>
             <a:fld id="{8BF48431-9A6F-8A44-AE8D-657D68852F8B}" type="datetimeFigureOut">
               <a:rPr kumimoji="1" lang="ko-Kore-KR" altLang="en-US" smtClean="0"/>
-              <a:t>2021. 6. 4.</a:t>
+              <a:t>2021. 6. 6.</a:t>
             </a:fld>
             <a:endParaRPr kumimoji="1" lang="ko-Kore-KR" altLang="en-US"/>
           </a:p>
@@ -3345,10 +3350,10 @@
       </p:grpSpPr>
       <p:pic>
         <p:nvPicPr>
-          <p:cNvPr id="5" name="그림 4" descr="텍스트이(가) 표시된 사진&#10;&#10;자동 생성된 설명">
-            <a:extLst>
-              <a:ext uri="{FF2B5EF4-FFF2-40B4-BE49-F238E27FC236}">
-                <a16:creationId xmlns:a16="http://schemas.microsoft.com/office/drawing/2014/main" id="{C27BDB21-B171-3447-ACFA-E1D131E54CE5}"/>
+          <p:cNvPr id="6" name="그림 5">
+            <a:extLst>
+              <a:ext uri="{FF2B5EF4-FFF2-40B4-BE49-F238E27FC236}">
+                <a16:creationId xmlns:a16="http://schemas.microsoft.com/office/drawing/2014/main" id="{92A2536B-DE37-E34C-9EF9-E049616154CD}"/>
               </a:ext>
             </a:extLst>
           </p:cNvPr>
@@ -3365,14 +3370,170 @@
         </p:blipFill>
         <p:spPr>
           <a:xfrm>
-            <a:off x="2840288" y="1020462"/>
-            <a:ext cx="6511424" cy="4817075"/>
+            <a:off x="2640793" y="775435"/>
+            <a:ext cx="6910414" cy="5307130"/>
           </a:xfrm>
           <a:prstGeom prst="rect">
             <a:avLst/>
           </a:prstGeom>
         </p:spPr>
       </p:pic>
+      <p:sp>
+        <p:nvSpPr>
+          <p:cNvPr id="2" name="직사각형 1">
+            <a:extLst>
+              <a:ext uri="{FF2B5EF4-FFF2-40B4-BE49-F238E27FC236}">
+                <a16:creationId xmlns:a16="http://schemas.microsoft.com/office/drawing/2014/main" id="{0FE8996D-EE11-DB49-9BAA-49B9FE46C88D}"/>
+              </a:ext>
+            </a:extLst>
+          </p:cNvPr>
+          <p:cNvSpPr/>
+          <p:nvPr/>
+        </p:nvSpPr>
+        <p:spPr>
+          <a:xfrm>
+            <a:off x="4435366" y="1944414"/>
+            <a:ext cx="1587062" cy="241738"/>
+          </a:xfrm>
+          <a:prstGeom prst="rect">
+            <a:avLst/>
+          </a:prstGeom>
+          <a:noFill/>
+          <a:ln w="28575">
+            <a:solidFill>
+              <a:srgbClr val="FF0000"/>
+            </a:solidFill>
+          </a:ln>
+        </p:spPr>
+        <p:style>
+          <a:lnRef idx="2">
+            <a:schemeClr val="accent1">
+              <a:shade val="50000"/>
+            </a:schemeClr>
+          </a:lnRef>
+          <a:fillRef idx="1">
+            <a:schemeClr val="accent1"/>
+          </a:fillRef>
+          <a:effectRef idx="0">
+            <a:schemeClr val="accent1"/>
+          </a:effectRef>
+          <a:fontRef idx="minor">
+            <a:schemeClr val="lt1"/>
+          </a:fontRef>
+        </p:style>
+        <p:txBody>
+          <a:bodyPr rtlCol="0" anchor="ctr"/>
+          <a:lstStyle/>
+          <a:p>
+            <a:pPr algn="ctr"/>
+            <a:endParaRPr kumimoji="1" lang="ko-Kore-KR" altLang="en-US"/>
+          </a:p>
+        </p:txBody>
+      </p:sp>
+      <p:sp>
+        <p:nvSpPr>
+          <p:cNvPr id="4" name="직사각형 3">
+            <a:extLst>
+              <a:ext uri="{FF2B5EF4-FFF2-40B4-BE49-F238E27FC236}">
+                <a16:creationId xmlns:a16="http://schemas.microsoft.com/office/drawing/2014/main" id="{BFBD47B3-D437-DE44-99A9-6FB3CF76DFE0}"/>
+              </a:ext>
+            </a:extLst>
+          </p:cNvPr>
+          <p:cNvSpPr/>
+          <p:nvPr/>
+        </p:nvSpPr>
+        <p:spPr>
+          <a:xfrm>
+            <a:off x="6858000" y="1786759"/>
+            <a:ext cx="2517228" cy="241738"/>
+          </a:xfrm>
+          <a:prstGeom prst="rect">
+            <a:avLst/>
+          </a:prstGeom>
+          <a:noFill/>
+          <a:ln w="28575">
+            <a:solidFill>
+              <a:srgbClr val="FF0000"/>
+            </a:solidFill>
+          </a:ln>
+        </p:spPr>
+        <p:style>
+          <a:lnRef idx="2">
+            <a:schemeClr val="accent1">
+              <a:shade val="50000"/>
+            </a:schemeClr>
+          </a:lnRef>
+          <a:fillRef idx="1">
+            <a:schemeClr val="accent1"/>
+          </a:fillRef>
+          <a:effectRef idx="0">
+            <a:schemeClr val="accent1"/>
+          </a:effectRef>
+          <a:fontRef idx="minor">
+            <a:schemeClr val="lt1"/>
+          </a:fontRef>
+        </p:style>
+        <p:txBody>
+          <a:bodyPr rtlCol="0" anchor="ctr"/>
+          <a:lstStyle/>
+          <a:p>
+            <a:pPr algn="ctr"/>
+            <a:endParaRPr kumimoji="1" lang="ko-Kore-KR" altLang="en-US"/>
+          </a:p>
+        </p:txBody>
+      </p:sp>
+      <p:sp>
+        <p:nvSpPr>
+          <p:cNvPr id="5" name="직사각형 4">
+            <a:extLst>
+              <a:ext uri="{FF2B5EF4-FFF2-40B4-BE49-F238E27FC236}">
+                <a16:creationId xmlns:a16="http://schemas.microsoft.com/office/drawing/2014/main" id="{0E34581F-2536-C14B-9F31-A4780B56F129}"/>
+              </a:ext>
+            </a:extLst>
+          </p:cNvPr>
+          <p:cNvSpPr/>
+          <p:nvPr/>
+        </p:nvSpPr>
+        <p:spPr>
+          <a:xfrm>
+            <a:off x="8786649" y="5722884"/>
+            <a:ext cx="662151" cy="241738"/>
+          </a:xfrm>
+          <a:prstGeom prst="rect">
+            <a:avLst/>
+          </a:prstGeom>
+          <a:noFill/>
+          <a:ln w="28575">
+            <a:solidFill>
+              <a:srgbClr val="FF0000"/>
+            </a:solidFill>
+          </a:ln>
+        </p:spPr>
+        <p:style>
+          <a:lnRef idx="2">
+            <a:schemeClr val="accent1">
+              <a:shade val="50000"/>
+            </a:schemeClr>
+          </a:lnRef>
+          <a:fillRef idx="1">
+            <a:schemeClr val="accent1"/>
+          </a:fillRef>
+          <a:effectRef idx="0">
+            <a:schemeClr val="accent1"/>
+          </a:effectRef>
+          <a:fontRef idx="minor">
+            <a:schemeClr val="lt1"/>
+          </a:fontRef>
+        </p:style>
+        <p:txBody>
+          <a:bodyPr rtlCol="0" anchor="ctr"/>
+          <a:lstStyle/>
+          <a:p>
+            <a:pPr algn="ctr"/>
+            <a:endParaRPr kumimoji="1" lang="ko-Kore-KR" altLang="en-US"/>
+          </a:p>
+        </p:txBody>
+      </p:sp>
     </p:spTree>
     <p:extLst>
       <p:ext uri="{BB962C8B-B14F-4D97-AF65-F5344CB8AC3E}">
@@ -3403,6 +3564,228 @@
           <a:chExt cx="0" cy="0"/>
         </a:xfrm>
       </p:grpSpPr>
+      <p:pic>
+        <p:nvPicPr>
+          <p:cNvPr id="3" name="그림 2">
+            <a:extLst>
+              <a:ext uri="{FF2B5EF4-FFF2-40B4-BE49-F238E27FC236}">
+                <a16:creationId xmlns:a16="http://schemas.microsoft.com/office/drawing/2014/main" id="{3A710786-AFDB-204F-9837-7D4F0EBD94FB}"/>
+              </a:ext>
+            </a:extLst>
+          </p:cNvPr>
+          <p:cNvPicPr>
+            <a:picLocks noChangeAspect="1"/>
+          </p:cNvPicPr>
+          <p:nvPr/>
+        </p:nvPicPr>
+        <p:blipFill>
+          <a:blip r:embed="rId2"/>
+          <a:stretch>
+            <a:fillRect/>
+          </a:stretch>
+        </p:blipFill>
+        <p:spPr>
+          <a:xfrm>
+            <a:off x="2307437" y="520178"/>
+            <a:ext cx="7577126" cy="5817643"/>
+          </a:xfrm>
+          <a:prstGeom prst="rect">
+            <a:avLst/>
+          </a:prstGeom>
+        </p:spPr>
+      </p:pic>
+      <p:sp>
+        <p:nvSpPr>
+          <p:cNvPr id="4" name="직사각형 3">
+            <a:extLst>
+              <a:ext uri="{FF2B5EF4-FFF2-40B4-BE49-F238E27FC236}">
+                <a16:creationId xmlns:a16="http://schemas.microsoft.com/office/drawing/2014/main" id="{E9115873-D64B-E045-BFEC-0E028D123F5C}"/>
+              </a:ext>
+            </a:extLst>
+          </p:cNvPr>
+          <p:cNvSpPr/>
+          <p:nvPr/>
+        </p:nvSpPr>
+        <p:spPr>
+          <a:xfrm>
+            <a:off x="4677103" y="3092670"/>
+            <a:ext cx="1713187" cy="283779"/>
+          </a:xfrm>
+          <a:prstGeom prst="rect">
+            <a:avLst/>
+          </a:prstGeom>
+          <a:noFill/>
+          <a:ln w="28575">
+            <a:solidFill>
+              <a:srgbClr val="FF0000"/>
+            </a:solidFill>
+          </a:ln>
+        </p:spPr>
+        <p:style>
+          <a:lnRef idx="2">
+            <a:schemeClr val="accent1">
+              <a:shade val="50000"/>
+            </a:schemeClr>
+          </a:lnRef>
+          <a:fillRef idx="1">
+            <a:schemeClr val="accent1"/>
+          </a:fillRef>
+          <a:effectRef idx="0">
+            <a:schemeClr val="accent1"/>
+          </a:effectRef>
+          <a:fontRef idx="minor">
+            <a:schemeClr val="lt1"/>
+          </a:fontRef>
+        </p:style>
+        <p:txBody>
+          <a:bodyPr rtlCol="0" anchor="ctr"/>
+          <a:lstStyle/>
+          <a:p>
+            <a:pPr algn="ctr"/>
+            <a:endParaRPr kumimoji="1" lang="ko-Kore-KR" altLang="en-US"/>
+          </a:p>
+        </p:txBody>
+      </p:sp>
+      <p:sp>
+        <p:nvSpPr>
+          <p:cNvPr id="5" name="직사각형 4">
+            <a:extLst>
+              <a:ext uri="{FF2B5EF4-FFF2-40B4-BE49-F238E27FC236}">
+                <a16:creationId xmlns:a16="http://schemas.microsoft.com/office/drawing/2014/main" id="{2811736B-B173-2543-AE55-FDCD7DC9D9BD}"/>
+              </a:ext>
+            </a:extLst>
+          </p:cNvPr>
+          <p:cNvSpPr/>
+          <p:nvPr/>
+        </p:nvSpPr>
+        <p:spPr>
+          <a:xfrm>
+            <a:off x="4677103" y="2575035"/>
+            <a:ext cx="1713187" cy="283779"/>
+          </a:xfrm>
+          <a:prstGeom prst="rect">
+            <a:avLst/>
+          </a:prstGeom>
+          <a:noFill/>
+          <a:ln w="28575">
+            <a:solidFill>
+              <a:srgbClr val="FF0000"/>
+            </a:solidFill>
+          </a:ln>
+        </p:spPr>
+        <p:style>
+          <a:lnRef idx="2">
+            <a:schemeClr val="accent1">
+              <a:shade val="50000"/>
+            </a:schemeClr>
+          </a:lnRef>
+          <a:fillRef idx="1">
+            <a:schemeClr val="accent1"/>
+          </a:fillRef>
+          <a:effectRef idx="0">
+            <a:schemeClr val="accent1"/>
+          </a:effectRef>
+          <a:fontRef idx="minor">
+            <a:schemeClr val="lt1"/>
+          </a:fontRef>
+        </p:style>
+        <p:txBody>
+          <a:bodyPr rtlCol="0" anchor="ctr"/>
+          <a:lstStyle/>
+          <a:p>
+            <a:pPr algn="ctr"/>
+            <a:endParaRPr kumimoji="1" lang="ko-Kore-KR" altLang="en-US"/>
+          </a:p>
+        </p:txBody>
+      </p:sp>
+      <p:sp>
+        <p:nvSpPr>
+          <p:cNvPr id="6" name="TextBox 5">
+            <a:extLst>
+              <a:ext uri="{FF2B5EF4-FFF2-40B4-BE49-F238E27FC236}">
+                <a16:creationId xmlns:a16="http://schemas.microsoft.com/office/drawing/2014/main" id="{C791497F-8100-4143-B155-4C14DE6FED0D}"/>
+              </a:ext>
+            </a:extLst>
+          </p:cNvPr>
+          <p:cNvSpPr txBox="1"/>
+          <p:nvPr/>
+        </p:nvSpPr>
+        <p:spPr>
+          <a:xfrm>
+            <a:off x="6390290" y="2532258"/>
+            <a:ext cx="1160895" cy="369332"/>
+          </a:xfrm>
+          <a:prstGeom prst="rect">
+            <a:avLst/>
+          </a:prstGeom>
+          <a:noFill/>
+        </p:spPr>
+        <p:txBody>
+          <a:bodyPr wrap="none" rtlCol="0">
+            <a:spAutoFit/>
+          </a:bodyPr>
+          <a:lstStyle/>
+          <a:p>
+            <a:r>
+              <a:rPr kumimoji="1" lang="ko-KR" altLang="en-US" dirty="0">
+                <a:solidFill>
+                  <a:srgbClr val="FF0000"/>
+                </a:solidFill>
+              </a:rPr>
+              <a:t>패키지 명</a:t>
+            </a:r>
+            <a:endParaRPr kumimoji="1" lang="ko-Kore-KR" altLang="en-US" dirty="0">
+              <a:solidFill>
+                <a:srgbClr val="FF0000"/>
+              </a:solidFill>
+            </a:endParaRPr>
+          </a:p>
+        </p:txBody>
+      </p:sp>
+      <p:sp>
+        <p:nvSpPr>
+          <p:cNvPr id="7" name="TextBox 6">
+            <a:extLst>
+              <a:ext uri="{FF2B5EF4-FFF2-40B4-BE49-F238E27FC236}">
+                <a16:creationId xmlns:a16="http://schemas.microsoft.com/office/drawing/2014/main" id="{4BCF7E3D-33F2-8145-93C1-00F38E9587F0}"/>
+              </a:ext>
+            </a:extLst>
+          </p:cNvPr>
+          <p:cNvSpPr txBox="1"/>
+          <p:nvPr/>
+        </p:nvSpPr>
+        <p:spPr>
+          <a:xfrm>
+            <a:off x="6390290" y="3049158"/>
+            <a:ext cx="930063" cy="369332"/>
+          </a:xfrm>
+          <a:prstGeom prst="rect">
+            <a:avLst/>
+          </a:prstGeom>
+          <a:noFill/>
+        </p:spPr>
+        <p:txBody>
+          <a:bodyPr wrap="none" rtlCol="0">
+            <a:spAutoFit/>
+          </a:bodyPr>
+          <a:lstStyle/>
+          <a:p>
+            <a:r>
+              <a:rPr kumimoji="1" lang="ko-KR" altLang="en-US" dirty="0">
+                <a:solidFill>
+                  <a:srgbClr val="FF0000"/>
+                </a:solidFill>
+              </a:rPr>
+              <a:t>빌드 명</a:t>
+            </a:r>
+            <a:endParaRPr kumimoji="1" lang="ko-Kore-KR" altLang="en-US" dirty="0">
+              <a:solidFill>
+                <a:srgbClr val="FF0000"/>
+              </a:solidFill>
+            </a:endParaRPr>
+          </a:p>
+        </p:txBody>
+      </p:sp>
     </p:spTree>
     <p:extLst>
       <p:ext uri="{BB962C8B-B14F-4D97-AF65-F5344CB8AC3E}">

</xml_diff>

<commit_message>
Update | HTTPS, HTTP2
</commit_message>
<xml_diff>
--- a/03-스프링 부트 개념과 활용/assets/image.pptx
+++ b/03-스프링 부트 개념과 활용/assets/image.pptx
@@ -4682,36 +4682,109 @@
           <a:chExt cx="0" cy="0"/>
         </a:xfrm>
       </p:grpSpPr>
-      <p:pic>
-        <p:nvPicPr>
-          <p:cNvPr id="2" name="그림 1">
-            <a:extLst>
-              <a:ext uri="{FF2B5EF4-FFF2-40B4-BE49-F238E27FC236}">
-                <a16:creationId xmlns:a16="http://schemas.microsoft.com/office/drawing/2014/main" id="{7E009DB3-0F18-654F-A207-98925BC09372}"/>
-              </a:ext>
-            </a:extLst>
-          </p:cNvPr>
-          <p:cNvPicPr>
-            <a:picLocks noChangeAspect="1"/>
-          </p:cNvPicPr>
+      <p:grpSp>
+        <p:nvGrpSpPr>
+          <p:cNvPr id="4" name="그룹 3">
+            <a:extLst>
+              <a:ext uri="{FF2B5EF4-FFF2-40B4-BE49-F238E27FC236}">
+                <a16:creationId xmlns:a16="http://schemas.microsoft.com/office/drawing/2014/main" id="{803E1DA2-37EB-E244-B480-229D53944E3F}"/>
+              </a:ext>
+            </a:extLst>
+          </p:cNvPr>
+          <p:cNvGrpSpPr/>
           <p:nvPr/>
-        </p:nvPicPr>
-        <p:blipFill>
-          <a:blip r:embed="rId2"/>
-          <a:stretch>
-            <a:fillRect/>
-          </a:stretch>
-        </p:blipFill>
-        <p:spPr>
+        </p:nvGrpSpPr>
+        <p:grpSpPr>
           <a:xfrm>
-            <a:off x="1340068" y="654269"/>
+            <a:off x="2434991" y="612839"/>
             <a:ext cx="7322018" cy="5632322"/>
+            <a:chOff x="1340068" y="654269"/>
+            <a:chExt cx="7322018" cy="5632322"/>
           </a:xfrm>
-          <a:prstGeom prst="rect">
-            <a:avLst/>
-          </a:prstGeom>
-        </p:spPr>
-      </p:pic>
+        </p:grpSpPr>
+        <p:pic>
+          <p:nvPicPr>
+            <p:cNvPr id="2" name="그림 1">
+              <a:extLst>
+                <a:ext uri="{FF2B5EF4-FFF2-40B4-BE49-F238E27FC236}">
+                  <a16:creationId xmlns:a16="http://schemas.microsoft.com/office/drawing/2014/main" id="{7E009DB3-0F18-654F-A207-98925BC09372}"/>
+                </a:ext>
+              </a:extLst>
+            </p:cNvPr>
+            <p:cNvPicPr>
+              <a:picLocks noChangeAspect="1"/>
+            </p:cNvPicPr>
+            <p:nvPr/>
+          </p:nvPicPr>
+          <p:blipFill>
+            <a:blip r:embed="rId2"/>
+            <a:stretch>
+              <a:fillRect/>
+            </a:stretch>
+          </p:blipFill>
+          <p:spPr>
+            <a:xfrm>
+              <a:off x="1340068" y="654269"/>
+              <a:ext cx="7322018" cy="5632322"/>
+            </a:xfrm>
+            <a:prstGeom prst="rect">
+              <a:avLst/>
+            </a:prstGeom>
+          </p:spPr>
+        </p:pic>
+        <p:sp>
+          <p:nvSpPr>
+            <p:cNvPr id="3" name="직사각형 2">
+              <a:extLst>
+                <a:ext uri="{FF2B5EF4-FFF2-40B4-BE49-F238E27FC236}">
+                  <a16:creationId xmlns:a16="http://schemas.microsoft.com/office/drawing/2014/main" id="{E26EEF19-3B89-164F-90A1-E7E1A3F3C1DB}"/>
+                </a:ext>
+              </a:extLst>
+            </p:cNvPr>
+            <p:cNvSpPr/>
+            <p:nvPr/>
+          </p:nvSpPr>
+          <p:spPr>
+            <a:xfrm>
+              <a:off x="4670854" y="5115697"/>
+              <a:ext cx="2471351" cy="654908"/>
+            </a:xfrm>
+            <a:prstGeom prst="rect">
+              <a:avLst/>
+            </a:prstGeom>
+            <a:noFill/>
+            <a:ln w="28575">
+              <a:solidFill>
+                <a:srgbClr val="FF0000"/>
+              </a:solidFill>
+            </a:ln>
+          </p:spPr>
+          <p:style>
+            <a:lnRef idx="2">
+              <a:schemeClr val="accent1">
+                <a:shade val="50000"/>
+              </a:schemeClr>
+            </a:lnRef>
+            <a:fillRef idx="1">
+              <a:schemeClr val="accent1"/>
+            </a:fillRef>
+            <a:effectRef idx="0">
+              <a:schemeClr val="accent1"/>
+            </a:effectRef>
+            <a:fontRef idx="minor">
+              <a:schemeClr val="lt1"/>
+            </a:fontRef>
+          </p:style>
+          <p:txBody>
+            <a:bodyPr rtlCol="0" anchor="ctr"/>
+            <a:lstStyle/>
+            <a:p>
+              <a:pPr algn="ctr"/>
+              <a:endParaRPr kumimoji="1" lang="ko-Kore-KR" altLang="en-US"/>
+            </a:p>
+          </p:txBody>
+        </p:sp>
+      </p:grpSp>
     </p:spTree>
     <p:extLst>
       <p:ext uri="{BB962C8B-B14F-4D97-AF65-F5344CB8AC3E}">

</xml_diff>